<commit_message>
Updated with Display Mode screenshots
</commit_message>
<xml_diff>
--- a/BuildingForTheMobileWeb.pptx
+++ b/BuildingForTheMobileWeb.pptx
@@ -6,10 +6,10 @@
     <p:sldMasterId id="2147483779" r:id="rId5"/>
   </p:sldMasterIdLst>
   <p:notesMasterIdLst>
-    <p:notesMasterId r:id="rId16"/>
+    <p:notesMasterId r:id="rId17"/>
   </p:notesMasterIdLst>
   <p:handoutMasterIdLst>
-    <p:handoutMasterId r:id="rId17"/>
+    <p:handoutMasterId r:id="rId18"/>
   </p:handoutMasterIdLst>
   <p:sldIdLst>
     <p:sldId id="296" r:id="rId6"/>
@@ -19,14 +19,15 @@
     <p:sldId id="297" r:id="rId10"/>
     <p:sldId id="300" r:id="rId11"/>
     <p:sldId id="298" r:id="rId12"/>
-    <p:sldId id="302" r:id="rId13"/>
-    <p:sldId id="299" r:id="rId14"/>
-    <p:sldId id="292" r:id="rId15"/>
+    <p:sldId id="303" r:id="rId13"/>
+    <p:sldId id="302" r:id="rId14"/>
+    <p:sldId id="299" r:id="rId15"/>
+    <p:sldId id="292" r:id="rId16"/>
   </p:sldIdLst>
   <p:sldSz cx="12188825" cy="6858000"/>
   <p:notesSz cx="6858000" cy="9296400"/>
   <p:custDataLst>
-    <p:tags r:id="rId18"/>
+    <p:tags r:id="rId19"/>
   </p:custDataLst>
   <p:defaultTextStyle>
     <a:defPPr>
@@ -182,16 +183,33 @@
 </file>
 
 <file path=ppt/diagrams/colors1.xml><?xml version="1.0" encoding="utf-8"?>
-<dgm:colorsDef xmlns:dgm="http://schemas.openxmlformats.org/drawingml/2006/diagram" xmlns:a="http://schemas.openxmlformats.org/drawingml/2006/main" uniqueId="urn:microsoft.com/office/officeart/2005/8/colors/accent1_3">
+<dgm:colorsDef xmlns:dgm="http://schemas.openxmlformats.org/drawingml/2006/diagram" xmlns:a="http://schemas.openxmlformats.org/drawingml/2006/main" uniqueId="urn:microsoft.com/office/officeart/2005/8/colors/accent2_3">
   <dgm:title val=""/>
   <dgm:desc val=""/>
   <dgm:catLst>
-    <dgm:cat type="accent1" pri="11300"/>
+    <dgm:cat type="accent2" pri="11300"/>
   </dgm:catLst>
   <dgm:styleLbl name="node0">
     <dgm:fillClrLst meth="repeat">
-      <a:schemeClr val="accent1">
+      <a:schemeClr val="accent2">
         <a:shade val="80000"/>
+      </a:schemeClr>
+    </dgm:fillClrLst>
+    <dgm:linClrLst meth="repeat">
+      <a:schemeClr val="lt1"/>
+    </dgm:linClrLst>
+    <dgm:effectClrLst/>
+    <dgm:txLinClrLst/>
+    <dgm:txFillClrLst/>
+    <dgm:txEffectClrLst/>
+  </dgm:styleLbl>
+  <dgm:styleLbl name="node1">
+    <dgm:fillClrLst>
+      <a:schemeClr val="accent2">
+        <a:shade val="80000"/>
+      </a:schemeClr>
+      <a:schemeClr val="accent2">
+        <a:tint val="70000"/>
       </a:schemeClr>
     </dgm:fillClrLst>
     <dgm:linClrLst meth="repeat">
@@ -204,18 +222,18 @@
   </dgm:styleLbl>
   <dgm:styleLbl name="alignNode1">
     <dgm:fillClrLst>
-      <a:schemeClr val="accent1">
+      <a:schemeClr val="accent2">
         <a:shade val="80000"/>
       </a:schemeClr>
-      <a:schemeClr val="accent1">
+      <a:schemeClr val="accent2">
         <a:tint val="70000"/>
       </a:schemeClr>
     </dgm:fillClrLst>
     <dgm:linClrLst>
-      <a:schemeClr val="accent1">
+      <a:schemeClr val="accent2">
         <a:shade val="80000"/>
       </a:schemeClr>
-      <a:schemeClr val="accent1">
+      <a:schemeClr val="accent2">
         <a:tint val="70000"/>
       </a:schemeClr>
     </dgm:linClrLst>
@@ -224,29 +242,12 @@
     <dgm:txFillClrLst/>
     <dgm:txEffectClrLst/>
   </dgm:styleLbl>
-  <dgm:styleLbl name="node1">
+  <dgm:styleLbl name="lnNode1">
     <dgm:fillClrLst>
-      <a:schemeClr val="accent1">
+      <a:schemeClr val="accent2">
         <a:shade val="80000"/>
       </a:schemeClr>
-      <a:schemeClr val="accent1">
-        <a:tint val="70000"/>
-      </a:schemeClr>
-    </dgm:fillClrLst>
-    <dgm:linClrLst meth="repeat">
-      <a:schemeClr val="lt1"/>
-    </dgm:linClrLst>
-    <dgm:effectClrLst/>
-    <dgm:txLinClrLst/>
-    <dgm:txFillClrLst/>
-    <dgm:txEffectClrLst/>
-  </dgm:styleLbl>
-  <dgm:styleLbl name="lnNode1">
-    <dgm:fillClrLst>
-      <a:schemeClr val="accent1">
-        <a:shade val="80000"/>
-      </a:schemeClr>
-      <a:schemeClr val="accent1">
+      <a:schemeClr val="accent2">
         <a:tint val="70000"/>
       </a:schemeClr>
     </dgm:fillClrLst>
@@ -260,11 +261,11 @@
   </dgm:styleLbl>
   <dgm:styleLbl name="vennNode1">
     <dgm:fillClrLst>
-      <a:schemeClr val="accent1">
+      <a:schemeClr val="accent2">
         <a:shade val="80000"/>
         <a:alpha val="50000"/>
       </a:schemeClr>
-      <a:schemeClr val="accent1">
+      <a:schemeClr val="accent2">
         <a:tint val="70000"/>
         <a:alpha val="50000"/>
       </a:schemeClr>
@@ -279,7 +280,7 @@
   </dgm:styleLbl>
   <dgm:styleLbl name="node2">
     <dgm:fillClrLst>
-      <a:schemeClr val="accent1">
+      <a:schemeClr val="accent2">
         <a:tint val="99000"/>
       </a:schemeClr>
     </dgm:fillClrLst>
@@ -293,7 +294,7 @@
   </dgm:styleLbl>
   <dgm:styleLbl name="node3">
     <dgm:fillClrLst>
-      <a:schemeClr val="accent1">
+      <a:schemeClr val="accent2">
         <a:tint val="80000"/>
       </a:schemeClr>
     </dgm:fillClrLst>
@@ -307,7 +308,7 @@
   </dgm:styleLbl>
   <dgm:styleLbl name="node4">
     <dgm:fillClrLst>
-      <a:schemeClr val="accent1">
+      <a:schemeClr val="accent2">
         <a:tint val="70000"/>
       </a:schemeClr>
     </dgm:fillClrLst>
@@ -321,10 +322,10 @@
   </dgm:styleLbl>
   <dgm:styleLbl name="fgImgPlace1">
     <dgm:fillClrLst>
-      <a:schemeClr val="accent1">
+      <a:schemeClr val="accent2">
         <a:tint val="50000"/>
       </a:schemeClr>
-      <a:schemeClr val="accent1">
+      <a:schemeClr val="accent2">
         <a:tint val="20000"/>
       </a:schemeClr>
     </dgm:fillClrLst>
@@ -340,10 +341,10 @@
   </dgm:styleLbl>
   <dgm:styleLbl name="alignImgPlace1">
     <dgm:fillClrLst>
-      <a:schemeClr val="accent1">
+      <a:schemeClr val="accent2">
         <a:tint val="50000"/>
       </a:schemeClr>
-      <a:schemeClr val="accent1">
+      <a:schemeClr val="accent2">
         <a:tint val="20000"/>
       </a:schemeClr>
     </dgm:fillClrLst>
@@ -359,10 +360,10 @@
   </dgm:styleLbl>
   <dgm:styleLbl name="bgImgPlace1">
     <dgm:fillClrLst>
-      <a:schemeClr val="accent1">
+      <a:schemeClr val="accent2">
         <a:tint val="50000"/>
       </a:schemeClr>
-      <a:schemeClr val="accent1">
+      <a:schemeClr val="accent2">
         <a:tint val="20000"/>
       </a:schemeClr>
     </dgm:fillClrLst>
@@ -378,18 +379,18 @@
   </dgm:styleLbl>
   <dgm:styleLbl name="sibTrans2D1">
     <dgm:fillClrLst>
-      <a:schemeClr val="accent1">
+      <a:schemeClr val="accent2">
         <a:shade val="90000"/>
       </a:schemeClr>
-      <a:schemeClr val="accent1">
+      <a:schemeClr val="accent2">
         <a:tint val="70000"/>
       </a:schemeClr>
     </dgm:fillClrLst>
     <dgm:linClrLst>
-      <a:schemeClr val="accent1">
+      <a:schemeClr val="accent2">
         <a:shade val="90000"/>
       </a:schemeClr>
-      <a:schemeClr val="accent1">
+      <a:schemeClr val="accent2">
         <a:tint val="70000"/>
       </a:schemeClr>
     </dgm:linClrLst>
@@ -400,18 +401,18 @@
   </dgm:styleLbl>
   <dgm:styleLbl name="fgSibTrans2D1">
     <dgm:fillClrLst>
-      <a:schemeClr val="accent1">
+      <a:schemeClr val="accent2">
         <a:shade val="90000"/>
       </a:schemeClr>
-      <a:schemeClr val="accent1">
+      <a:schemeClr val="accent2">
         <a:tint val="70000"/>
       </a:schemeClr>
     </dgm:fillClrLst>
     <dgm:linClrLst>
-      <a:schemeClr val="accent1">
+      <a:schemeClr val="accent2">
         <a:shade val="90000"/>
       </a:schemeClr>
-      <a:schemeClr val="accent1">
+      <a:schemeClr val="accent2">
         <a:tint val="70000"/>
       </a:schemeClr>
     </dgm:linClrLst>
@@ -424,18 +425,18 @@
   </dgm:styleLbl>
   <dgm:styleLbl name="bgSibTrans2D1">
     <dgm:fillClrLst>
-      <a:schemeClr val="accent1">
+      <a:schemeClr val="accent2">
         <a:shade val="90000"/>
       </a:schemeClr>
-      <a:schemeClr val="accent1">
+      <a:schemeClr val="accent2">
         <a:tint val="70000"/>
       </a:schemeClr>
     </dgm:fillClrLst>
     <dgm:linClrLst>
-      <a:schemeClr val="accent1">
+      <a:schemeClr val="accent2">
         <a:shade val="90000"/>
       </a:schemeClr>
-      <a:schemeClr val="accent1">
+      <a:schemeClr val="accent2">
         <a:tint val="70000"/>
       </a:schemeClr>
     </dgm:linClrLst>
@@ -448,18 +449,18 @@
   </dgm:styleLbl>
   <dgm:styleLbl name="sibTrans1D1">
     <dgm:fillClrLst>
-      <a:schemeClr val="accent1">
+      <a:schemeClr val="accent2">
         <a:shade val="90000"/>
       </a:schemeClr>
-      <a:schemeClr val="accent1">
+      <a:schemeClr val="accent2">
         <a:tint val="70000"/>
       </a:schemeClr>
     </dgm:fillClrLst>
     <dgm:linClrLst>
-      <a:schemeClr val="accent1">
+      <a:schemeClr val="accent2">
         <a:shade val="90000"/>
       </a:schemeClr>
-      <a:schemeClr val="accent1">
+      <a:schemeClr val="accent2">
         <a:tint val="70000"/>
       </a:schemeClr>
     </dgm:linClrLst>
@@ -472,10 +473,10 @@
   </dgm:styleLbl>
   <dgm:styleLbl name="callout">
     <dgm:fillClrLst meth="repeat">
-      <a:schemeClr val="accent1"/>
+      <a:schemeClr val="accent2"/>
     </dgm:fillClrLst>
     <dgm:linClrLst meth="repeat">
-      <a:schemeClr val="accent1"/>
+      <a:schemeClr val="accent2"/>
     </dgm:linClrLst>
     <dgm:effectClrLst/>
     <dgm:txLinClrLst/>
@@ -486,7 +487,7 @@
   </dgm:styleLbl>
   <dgm:styleLbl name="asst0">
     <dgm:fillClrLst meth="repeat">
-      <a:schemeClr val="accent1">
+      <a:schemeClr val="accent2">
         <a:shade val="80000"/>
       </a:schemeClr>
     </dgm:fillClrLst>
@@ -500,7 +501,7 @@
   </dgm:styleLbl>
   <dgm:styleLbl name="asst1">
     <dgm:fillClrLst meth="repeat">
-      <a:schemeClr val="accent1">
+      <a:schemeClr val="accent2">
         <a:shade val="80000"/>
       </a:schemeClr>
     </dgm:fillClrLst>
@@ -514,7 +515,7 @@
   </dgm:styleLbl>
   <dgm:styleLbl name="asst2">
     <dgm:fillClrLst>
-      <a:schemeClr val="accent1">
+      <a:schemeClr val="accent2">
         <a:tint val="99000"/>
       </a:schemeClr>
     </dgm:fillClrLst>
@@ -528,7 +529,7 @@
   </dgm:styleLbl>
   <dgm:styleLbl name="asst3">
     <dgm:fillClrLst>
-      <a:schemeClr val="accent1">
+      <a:schemeClr val="accent2">
         <a:tint val="80000"/>
       </a:schemeClr>
     </dgm:fillClrLst>
@@ -542,7 +543,7 @@
   </dgm:styleLbl>
   <dgm:styleLbl name="asst4">
     <dgm:fillClrLst>
-      <a:schemeClr val="accent1">
+      <a:schemeClr val="accent2">
         <a:tint val="70000"/>
       </a:schemeClr>
     </dgm:fillClrLst>
@@ -556,12 +557,12 @@
   </dgm:styleLbl>
   <dgm:styleLbl name="parChTrans2D1">
     <dgm:fillClrLst meth="repeat">
-      <a:schemeClr val="accent1">
+      <a:schemeClr val="accent2">
         <a:tint val="60000"/>
       </a:schemeClr>
     </dgm:fillClrLst>
     <dgm:linClrLst meth="repeat">
-      <a:schemeClr val="accent1">
+      <a:schemeClr val="accent2">
         <a:tint val="60000"/>
       </a:schemeClr>
     </dgm:linClrLst>
@@ -574,12 +575,12 @@
   </dgm:styleLbl>
   <dgm:styleLbl name="parChTrans2D2">
     <dgm:fillClrLst meth="repeat">
-      <a:schemeClr val="accent1">
+      <a:schemeClr val="accent2">
         <a:tint val="90000"/>
       </a:schemeClr>
     </dgm:fillClrLst>
     <dgm:linClrLst meth="repeat">
-      <a:schemeClr val="accent1">
+      <a:schemeClr val="accent2">
         <a:tint val="90000"/>
       </a:schemeClr>
     </dgm:linClrLst>
@@ -590,12 +591,12 @@
   </dgm:styleLbl>
   <dgm:styleLbl name="parChTrans2D3">
     <dgm:fillClrLst meth="repeat">
-      <a:schemeClr val="accent1">
+      <a:schemeClr val="accent2">
         <a:tint val="70000"/>
       </a:schemeClr>
     </dgm:fillClrLst>
     <dgm:linClrLst meth="repeat">
-      <a:schemeClr val="accent1">
+      <a:schemeClr val="accent2">
         <a:tint val="70000"/>
       </a:schemeClr>
     </dgm:linClrLst>
@@ -606,12 +607,12 @@
   </dgm:styleLbl>
   <dgm:styleLbl name="parChTrans2D4">
     <dgm:fillClrLst meth="repeat">
-      <a:schemeClr val="accent1">
+      <a:schemeClr val="accent2">
         <a:tint val="50000"/>
       </a:schemeClr>
     </dgm:fillClrLst>
     <dgm:linClrLst meth="repeat">
-      <a:schemeClr val="accent1">
+      <a:schemeClr val="accent2">
         <a:tint val="50000"/>
       </a:schemeClr>
     </dgm:linClrLst>
@@ -624,12 +625,12 @@
   </dgm:styleLbl>
   <dgm:styleLbl name="parChTrans1D1">
     <dgm:fillClrLst meth="repeat">
-      <a:schemeClr val="accent1">
+      <a:schemeClr val="accent2">
         <a:shade val="80000"/>
       </a:schemeClr>
     </dgm:fillClrLst>
     <dgm:linClrLst meth="repeat">
-      <a:schemeClr val="accent1">
+      <a:schemeClr val="accent2">
         <a:shade val="80000"/>
       </a:schemeClr>
     </dgm:linClrLst>
@@ -642,12 +643,12 @@
   </dgm:styleLbl>
   <dgm:styleLbl name="parChTrans1D2">
     <dgm:fillClrLst meth="repeat">
-      <a:schemeClr val="accent1">
+      <a:schemeClr val="accent2">
         <a:tint val="99000"/>
       </a:schemeClr>
     </dgm:fillClrLst>
     <dgm:linClrLst meth="repeat">
-      <a:schemeClr val="accent1">
+      <a:schemeClr val="accent2">
         <a:tint val="99000"/>
       </a:schemeClr>
     </dgm:linClrLst>
@@ -660,12 +661,12 @@
   </dgm:styleLbl>
   <dgm:styleLbl name="parChTrans1D3">
     <dgm:fillClrLst meth="repeat">
-      <a:schemeClr val="accent1">
+      <a:schemeClr val="accent2">
         <a:tint val="80000"/>
       </a:schemeClr>
     </dgm:fillClrLst>
     <dgm:linClrLst meth="repeat">
-      <a:schemeClr val="accent1">
+      <a:schemeClr val="accent2">
         <a:tint val="80000"/>
       </a:schemeClr>
     </dgm:linClrLst>
@@ -678,12 +679,12 @@
   </dgm:styleLbl>
   <dgm:styleLbl name="parChTrans1D4">
     <dgm:fillClrLst meth="repeat">
-      <a:schemeClr val="accent1">
+      <a:schemeClr val="accent2">
         <a:tint val="70000"/>
       </a:schemeClr>
     </dgm:fillClrLst>
     <dgm:linClrLst meth="repeat">
-      <a:schemeClr val="accent1">
+      <a:schemeClr val="accent2">
         <a:tint val="70000"/>
       </a:schemeClr>
     </dgm:linClrLst>
@@ -701,10 +702,10 @@
       </a:schemeClr>
     </dgm:fillClrLst>
     <dgm:linClrLst>
-      <a:schemeClr val="accent1">
+      <a:schemeClr val="accent2">
         <a:shade val="80000"/>
       </a:schemeClr>
-      <a:schemeClr val="accent1">
+      <a:schemeClr val="accent2">
         <a:tint val="70000"/>
       </a:schemeClr>
     </dgm:linClrLst>
@@ -722,10 +723,10 @@
       </a:schemeClr>
     </dgm:fillClrLst>
     <dgm:linClrLst>
-      <a:schemeClr val="accent1">
+      <a:schemeClr val="accent2">
         <a:shade val="80000"/>
       </a:schemeClr>
-      <a:schemeClr val="accent1">
+      <a:schemeClr val="accent2">
         <a:tint val="70000"/>
       </a:schemeClr>
     </dgm:linClrLst>
@@ -743,10 +744,10 @@
       </a:schemeClr>
     </dgm:fillClrLst>
     <dgm:linClrLst>
-      <a:schemeClr val="accent1">
+      <a:schemeClr val="accent2">
         <a:shade val="80000"/>
       </a:schemeClr>
-      <a:schemeClr val="accent1">
+      <a:schemeClr val="accent2">
         <a:tint val="70000"/>
       </a:schemeClr>
     </dgm:linClrLst>
@@ -764,7 +765,7 @@
       </a:schemeClr>
     </dgm:fillClrLst>
     <dgm:linClrLst meth="repeat">
-      <a:schemeClr val="accent1"/>
+      <a:schemeClr val="accent2"/>
     </dgm:linClrLst>
     <dgm:effectClrLst/>
     <dgm:txLinClrLst/>
@@ -780,10 +781,10 @@
       </a:schemeClr>
     </dgm:fillClrLst>
     <dgm:linClrLst>
-      <a:schemeClr val="accent1">
+      <a:schemeClr val="accent2">
         <a:shade val="80000"/>
       </a:schemeClr>
-      <a:schemeClr val="accent1">
+      <a:schemeClr val="accent2">
         <a:tint val="70000"/>
       </a:schemeClr>
     </dgm:linClrLst>
@@ -799,10 +800,10 @@
       <a:schemeClr val="lt1"/>
     </dgm:fillClrLst>
     <dgm:linClrLst>
-      <a:schemeClr val="accent1">
+      <a:schemeClr val="accent2">
         <a:shade val="80000"/>
       </a:schemeClr>
-      <a:schemeClr val="accent1">
+      <a:schemeClr val="accent2">
         <a:tint val="70000"/>
       </a:schemeClr>
     </dgm:linClrLst>
@@ -818,7 +819,7 @@
       <a:schemeClr val="lt1"/>
     </dgm:fillClrLst>
     <dgm:linClrLst meth="repeat">
-      <a:schemeClr val="accent1"/>
+      <a:schemeClr val="accent2"/>
     </dgm:linClrLst>
     <dgm:effectClrLst/>
     <dgm:txLinClrLst/>
@@ -832,7 +833,7 @@
       <a:schemeClr val="lt1"/>
     </dgm:fillClrLst>
     <dgm:linClrLst meth="repeat">
-      <a:schemeClr val="accent1"/>
+      <a:schemeClr val="accent2"/>
     </dgm:linClrLst>
     <dgm:effectClrLst/>
     <dgm:txLinClrLst/>
@@ -843,13 +844,13 @@
   </dgm:styleLbl>
   <dgm:styleLbl name="fgAccFollowNode1">
     <dgm:fillClrLst meth="repeat">
-      <a:schemeClr val="accent1">
+      <a:schemeClr val="accent2">
         <a:alpha val="90000"/>
         <a:tint val="40000"/>
       </a:schemeClr>
     </dgm:fillClrLst>
     <dgm:linClrLst meth="repeat">
-      <a:schemeClr val="accent1">
+      <a:schemeClr val="accent2">
         <a:alpha val="90000"/>
         <a:tint val="40000"/>
       </a:schemeClr>
@@ -863,13 +864,13 @@
   </dgm:styleLbl>
   <dgm:styleLbl name="alignAccFollowNode1">
     <dgm:fillClrLst meth="repeat">
-      <a:schemeClr val="accent1">
+      <a:schemeClr val="accent2">
         <a:alpha val="90000"/>
         <a:tint val="40000"/>
       </a:schemeClr>
     </dgm:fillClrLst>
     <dgm:linClrLst meth="repeat">
-      <a:schemeClr val="accent1">
+      <a:schemeClr val="accent2">
         <a:alpha val="90000"/>
         <a:tint val="40000"/>
       </a:schemeClr>
@@ -883,7 +884,7 @@
   </dgm:styleLbl>
   <dgm:styleLbl name="bgAccFollowNode1">
     <dgm:fillClrLst meth="repeat">
-      <a:schemeClr val="accent1">
+      <a:schemeClr val="accent2">
         <a:alpha val="90000"/>
         <a:tint val="40000"/>
       </a:schemeClr>
@@ -905,7 +906,7 @@
       </a:schemeClr>
     </dgm:fillClrLst>
     <dgm:linClrLst meth="repeat">
-      <a:schemeClr val="accent1">
+      <a:schemeClr val="accent2">
         <a:shade val="80000"/>
       </a:schemeClr>
     </dgm:linClrLst>
@@ -923,7 +924,7 @@
       </a:schemeClr>
     </dgm:fillClrLst>
     <dgm:linClrLst meth="repeat">
-      <a:schemeClr val="accent1">
+      <a:schemeClr val="accent2">
         <a:tint val="99000"/>
       </a:schemeClr>
     </dgm:linClrLst>
@@ -941,7 +942,7 @@
       </a:schemeClr>
     </dgm:fillClrLst>
     <dgm:linClrLst meth="repeat">
-      <a:schemeClr val="accent1">
+      <a:schemeClr val="accent2">
         <a:tint val="80000"/>
       </a:schemeClr>
     </dgm:linClrLst>
@@ -959,7 +960,7 @@
       </a:schemeClr>
     </dgm:fillClrLst>
     <dgm:linClrLst meth="repeat">
-      <a:schemeClr val="accent1">
+      <a:schemeClr val="accent2">
         <a:tint val="70000"/>
       </a:schemeClr>
     </dgm:linClrLst>
@@ -972,7 +973,7 @@
   </dgm:styleLbl>
   <dgm:styleLbl name="bgShp">
     <dgm:fillClrLst meth="repeat">
-      <a:schemeClr val="accent1">
+      <a:schemeClr val="accent2">
         <a:tint val="40000"/>
       </a:schemeClr>
     </dgm:fillClrLst>
@@ -988,7 +989,7 @@
   </dgm:styleLbl>
   <dgm:styleLbl name="dkBgShp">
     <dgm:fillClrLst meth="repeat">
-      <a:schemeClr val="accent1">
+      <a:schemeClr val="accent2">
         <a:shade val="90000"/>
       </a:schemeClr>
     </dgm:fillClrLst>
@@ -1004,13 +1005,13 @@
   </dgm:styleLbl>
   <dgm:styleLbl name="trBgShp">
     <dgm:fillClrLst meth="repeat">
-      <a:schemeClr val="accent1">
+      <a:schemeClr val="accent2">
         <a:tint val="50000"/>
         <a:alpha val="40000"/>
       </a:schemeClr>
     </dgm:fillClrLst>
     <dgm:linClrLst meth="repeat">
-      <a:schemeClr val="accent1"/>
+      <a:schemeClr val="accent2"/>
     </dgm:linClrLst>
     <dgm:effectClrLst/>
     <dgm:txLinClrLst/>
@@ -1021,7 +1022,7 @@
   </dgm:styleLbl>
   <dgm:styleLbl name="fgShp">
     <dgm:fillClrLst meth="repeat">
-      <a:schemeClr val="accent1">
+      <a:schemeClr val="accent2">
         <a:tint val="40000"/>
       </a:schemeClr>
     </dgm:fillClrLst>
@@ -1060,7 +1061,7 @@
 <dgm:dataModel xmlns:dgm="http://schemas.openxmlformats.org/drawingml/2006/diagram" xmlns:a="http://schemas.openxmlformats.org/drawingml/2006/main">
   <dgm:ptLst>
     <dgm:pt modelId="{69E7DF19-1910-416C-936F-EB2E6F37734B}" type="doc">
-      <dgm:prSet loTypeId="urn:microsoft.com/office/officeart/2005/8/layout/chevron1" loCatId="process" qsTypeId="urn:microsoft.com/office/officeart/2005/8/quickstyle/simple1" qsCatId="simple" csTypeId="urn:microsoft.com/office/officeart/2005/8/colors/accent1_3" csCatId="accent1" phldr="1"/>
+      <dgm:prSet loTypeId="urn:microsoft.com/office/officeart/2005/8/layout/chevron1" loCatId="process" qsTypeId="urn:microsoft.com/office/officeart/2005/8/quickstyle/simple1" qsCatId="simple" csTypeId="urn:microsoft.com/office/officeart/2005/8/colors/accent2_3" csCatId="accent2" phldr="1"/>
       <dgm:spPr/>
     </dgm:pt>
     <dgm:pt modelId="{DD3994C7-351F-4257-913D-F4A281A62D15}">
@@ -1290,7 +1291,7 @@
           <a:avLst/>
         </a:prstGeom>
         <a:solidFill>
-          <a:schemeClr val="accent1">
+          <a:schemeClr val="accent2">
             <a:shade val="80000"/>
             <a:hueOff val="0"/>
             <a:satOff val="0"/>
@@ -1368,11 +1369,11 @@
           <a:avLst/>
         </a:prstGeom>
         <a:solidFill>
-          <a:schemeClr val="accent1">
+          <a:schemeClr val="accent2">
             <a:shade val="80000"/>
-            <a:hueOff val="-378049"/>
-            <a:satOff val="0"/>
-            <a:lumOff val="16938"/>
+            <a:hueOff val="285527"/>
+            <a:satOff val="-9433"/>
+            <a:lumOff val="17283"/>
             <a:alphaOff val="0"/>
           </a:schemeClr>
         </a:solidFill>
@@ -1446,11 +1447,11 @@
           <a:avLst/>
         </a:prstGeom>
         <a:solidFill>
-          <a:schemeClr val="accent1">
+          <a:schemeClr val="accent2">
             <a:shade val="80000"/>
-            <a:hueOff val="-756098"/>
-            <a:satOff val="0"/>
-            <a:lumOff val="33875"/>
+            <a:hueOff val="571054"/>
+            <a:satOff val="-18867"/>
+            <a:lumOff val="34566"/>
             <a:alphaOff val="0"/>
           </a:schemeClr>
         </a:solidFill>
@@ -2923,7 +2924,7 @@
               <a:rPr lang="en-US" smtClean="0">
                 <a:latin typeface="Segoe UI" pitchFamily="34" charset="0"/>
               </a:rPr>
-              <a:t>12/1/2012</a:t>
+              <a:t>12/14/2012</a:t>
             </a:fld>
             <a:endParaRPr lang="en-US" dirty="0">
               <a:latin typeface="Segoe UI" pitchFamily="34" charset="0"/>
@@ -3105,7 +3106,7 @@
             <a:fld id="{CAE3F082-F902-42D8-A765-720E172C3194}" type="datetimeFigureOut">
               <a:rPr lang="en-US" smtClean="0"/>
               <a:pPr/>
-              <a:t>12/1/2012</a:t>
+              <a:t>12/14/2012</a:t>
             </a:fld>
             <a:endParaRPr lang="en-US" dirty="0"/>
           </a:p>
@@ -17342,6 +17343,128 @@
           <a:chExt cx="0" cy="0"/>
         </a:xfrm>
       </p:grpSpPr>
+      <p:sp>
+        <p:nvSpPr>
+          <p:cNvPr id="2" name="Title 1"/>
+          <p:cNvSpPr>
+            <a:spLocks noGrp="1"/>
+          </p:cNvSpPr>
+          <p:nvPr>
+            <p:ph type="title"/>
+          </p:nvPr>
+        </p:nvSpPr>
+        <p:spPr/>
+        <p:txBody>
+          <a:bodyPr/>
+          <a:lstStyle/>
+          <a:p>
+            <a:r>
+              <a:rPr lang="en-US" dirty="0" smtClean="0"/>
+              <a:t>Resources</a:t>
+            </a:r>
+            <a:endParaRPr lang="en-US" dirty="0"/>
+          </a:p>
+        </p:txBody>
+      </p:sp>
+      <p:sp>
+        <p:nvSpPr>
+          <p:cNvPr id="3" name="Text Placeholder 2"/>
+          <p:cNvSpPr>
+            <a:spLocks noGrp="1"/>
+          </p:cNvSpPr>
+          <p:nvPr>
+            <p:ph type="body" sz="quarter" idx="10"/>
+          </p:nvPr>
+        </p:nvSpPr>
+        <p:spPr>
+          <a:xfrm>
+            <a:off x="519112" y="1447799"/>
+            <a:ext cx="11149013" cy="1892826"/>
+          </a:xfrm>
+        </p:spPr>
+        <p:txBody>
+          <a:bodyPr/>
+          <a:lstStyle/>
+          <a:p>
+            <a:r>
+              <a:rPr lang="en-US" dirty="0">
+                <a:hlinkClick r:id="rId2"/>
+              </a:rPr>
+              <a:t>http://www.asp.net/mobile</a:t>
+            </a:r>
+            <a:endParaRPr lang="en-US" dirty="0"/>
+          </a:p>
+          <a:p>
+            <a:r>
+              <a:rPr lang="en-US">
+                <a:hlinkClick r:id="rId3"/>
+              </a:rPr>
+              <a:t>http://aka.ms/mvc4-adaptive-rendering</a:t>
+            </a:r>
+          </a:p>
+          <a:p>
+            <a:r>
+              <a:rPr lang="en-US" dirty="0" smtClean="0">
+                <a:hlinkClick r:id="rId3"/>
+              </a:rPr>
+              <a:t>http</a:t>
+            </a:r>
+            <a:r>
+              <a:rPr lang="en-US" dirty="0">
+                <a:hlinkClick r:id="rId3"/>
+              </a:rPr>
+              <a:t>://</a:t>
+            </a:r>
+            <a:r>
+              <a:rPr lang="en-US" dirty="0" smtClean="0">
+                <a:hlinkClick r:id="rId3"/>
+              </a:rPr>
+              <a:t>aka.ms/mvc4-mobile-tutorial</a:t>
+            </a:r>
+            <a:endParaRPr lang="en-US" dirty="0" smtClean="0"/>
+          </a:p>
+        </p:txBody>
+      </p:sp>
+    </p:spTree>
+    <p:extLst>
+      <p:ext uri="{BB962C8B-B14F-4D97-AF65-F5344CB8AC3E}">
+        <p14:creationId xmlns:p14="http://schemas.microsoft.com/office/powerpoint/2010/main" val="63434339"/>
+      </p:ext>
+    </p:extLst>
+  </p:cSld>
+  <p:clrMapOvr>
+    <a:masterClrMapping/>
+  </p:clrMapOvr>
+  <p:transition>
+    <p:fade/>
+  </p:transition>
+  <p:timing>
+    <p:tnLst>
+      <p:par>
+        <p:cTn id="1" dur="indefinite" restart="never" nodeType="tmRoot"/>
+      </p:par>
+    </p:tnLst>
+  </p:timing>
+</p:sld>
+</file>
+
+<file path=ppt/slides/slide11.xml><?xml version="1.0" encoding="utf-8"?>
+<p:sld xmlns:a="http://schemas.openxmlformats.org/drawingml/2006/main" xmlns:r="http://schemas.openxmlformats.org/officeDocument/2006/relationships" xmlns:p="http://schemas.openxmlformats.org/presentationml/2006/main">
+  <p:cSld>
+    <p:spTree>
+      <p:nvGrpSpPr>
+        <p:cNvPr id="1" name=""/>
+        <p:cNvGrpSpPr/>
+        <p:nvPr/>
+      </p:nvGrpSpPr>
+      <p:grpSpPr>
+        <a:xfrm>
+          <a:off x="0" y="0"/>
+          <a:ext cx="0" cy="0"/>
+          <a:chOff x="0" y="0"/>
+          <a:chExt cx="0" cy="0"/>
+        </a:xfrm>
+      </p:grpSpPr>
       <p:graphicFrame>
         <p:nvGraphicFramePr>
           <p:cNvPr id="2" name="Object 1" hidden="1"/>
@@ -17367,7 +17490,7 @@
           <a:graphicData uri="http://schemas.openxmlformats.org/presentationml/2006/ole">
             <mc:AlternateContent xmlns:mc="http://schemas.openxmlformats.org/markup-compatibility/2006">
               <mc:Choice xmlns:v="urn:schemas-microsoft-com:vml" Requires="v">
-                <p:oleObj spid="_x0000_s58477" name="think-cell Slide" r:id="rId4" imgW="270" imgH="270" progId="TCLayout.ActiveDocument.1">
+                <p:oleObj spid="_x0000_s58481" name="think-cell Slide" r:id="rId4" imgW="270" imgH="270" progId="TCLayout.ActiveDocument.1">
                   <p:embed/>
                 </p:oleObj>
               </mc:Choice>
@@ -17476,7 +17599,7 @@
           <a:graphicData uri="http://schemas.openxmlformats.org/presentationml/2006/ole">
             <mc:AlternateContent xmlns:mc="http://schemas.openxmlformats.org/markup-compatibility/2006">
               <mc:Choice xmlns:v="urn:schemas-microsoft-com:vml" Requires="v">
-                <p:oleObj spid="_x0000_s59497" name="think-cell Slide" r:id="rId4" imgW="270" imgH="270" progId="TCLayout.ActiveDocument.1">
+                <p:oleObj spid="_x0000_s59501" name="think-cell Slide" r:id="rId4" imgW="270" imgH="270" progId="TCLayout.ActiveDocument.1">
                   <p:embed/>
                 </p:oleObj>
               </mc:Choice>
@@ -17648,7 +17771,7 @@
           <a:graphicData uri="http://schemas.openxmlformats.org/presentationml/2006/ole">
             <mc:AlternateContent xmlns:mc="http://schemas.openxmlformats.org/markup-compatibility/2006">
               <mc:Choice xmlns:v="urn:schemas-microsoft-com:vml" Requires="v">
-                <p:oleObj spid="_x0000_s23662" name="think-cell Slide" r:id="rId6" imgW="270" imgH="270" progId="TCLayout.ActiveDocument.1">
+                <p:oleObj spid="_x0000_s23666" name="think-cell Slide" r:id="rId6" imgW="270" imgH="270" progId="TCLayout.ActiveDocument.1">
                   <p:embed/>
                 </p:oleObj>
               </mc:Choice>
@@ -17955,7 +18078,7 @@
           <p:nvPr>
             <p:extLst>
               <p:ext uri="{D42A27DB-BD31-4B8C-83A1-F6EECF244321}">
-                <p14:modId xmlns:p14="http://schemas.microsoft.com/office/powerpoint/2010/main" val="3121676279"/>
+                <p14:modId xmlns:p14="http://schemas.microsoft.com/office/powerpoint/2010/main" val="377125428"/>
               </p:ext>
             </p:extLst>
           </p:nvPr>
@@ -18105,12 +18228,10 @@
           <a:gradFill flip="none" rotWithShape="1">
             <a:gsLst>
               <a:gs pos="0">
-                <a:schemeClr val="accent6">
-                  <a:lumMod val="75000"/>
-                </a:schemeClr>
+                <a:srgbClr val="009DD9"/>
               </a:gs>
               <a:gs pos="100000">
-                <a:schemeClr val="accent5"/>
+                <a:srgbClr val="95CBF4"/>
               </a:gs>
             </a:gsLst>
             <a:lin ang="0" scaled="1"/>
@@ -18321,7 +18442,12 @@
             <p:ph type="title"/>
           </p:nvPr>
         </p:nvSpPr>
-        <p:spPr/>
+        <p:spPr>
+          <a:xfrm>
+            <a:off x="519111" y="228601"/>
+            <a:ext cx="11149014" cy="1994392"/>
+          </a:xfrm>
+        </p:spPr>
         <p:txBody>
           <a:bodyPr/>
           <a:lstStyle/>
@@ -18331,7 +18457,7 @@
               <a:t>Custom Modes: </a:t>
             </a:r>
             <a:r>
-              <a:rPr lang="en-US" sz="4800" i="1" dirty="0">
+              <a:rPr lang="en-US" sz="4000" i="1" dirty="0">
                 <a:latin typeface="Verdana"/>
                 <a:ea typeface="Calibri"/>
                 <a:cs typeface="Times New Roman"/>
@@ -18339,12 +18465,20 @@
               <a:t>Views\Shared\_</a:t>
             </a:r>
             <a:r>
-              <a:rPr lang="en-US" sz="4800" i="1" dirty="0" err="1">
+              <a:rPr lang="en-US" sz="4000" i="1" dirty="0" err="1" smtClean="0">
                 <a:latin typeface="Verdana"/>
                 <a:ea typeface="Calibri"/>
                 <a:cs typeface="Times New Roman"/>
               </a:rPr>
-              <a:t>Layout.iPhone.cshtml</a:t>
+              <a:t>Layout.WinPhone.csh</a:t>
+            </a:r>
+            <a:r>
+              <a:rPr lang="en-US" sz="4400" i="1" dirty="0" err="1" smtClean="0">
+                <a:latin typeface="Verdana"/>
+                <a:ea typeface="Calibri"/>
+                <a:cs typeface="Times New Roman"/>
+              </a:rPr>
+              <a:t>tml</a:t>
             </a:r>
             <a:r>
               <a:rPr lang="en-US" dirty="0"/>
@@ -18367,7 +18501,12 @@
             <p:ph type="body" sz="quarter" idx="10"/>
           </p:nvPr>
         </p:nvSpPr>
-        <p:spPr/>
+        <p:spPr>
+          <a:xfrm>
+            <a:off x="519114" y="1905000"/>
+            <a:ext cx="11149012" cy="2967992"/>
+          </a:xfrm>
+        </p:spPr>
         <p:txBody>
           <a:bodyPr/>
           <a:lstStyle/>
@@ -18440,7 +18579,7 @@
               <a:t>(“</a:t>
             </a:r>
             <a:r>
-              <a:rPr lang="en-US" sz="2800" b="1" dirty="0" smtClean="0">
+              <a:rPr lang="en-US" sz="2800" b="1" dirty="0" err="1" smtClean="0">
                 <a:solidFill>
                   <a:srgbClr val="000080"/>
                 </a:solidFill>
@@ -18448,7 +18587,7 @@
                 <a:ea typeface="Calibri"/>
                 <a:cs typeface="Times New Roman"/>
               </a:rPr>
-              <a:t>iPhone</a:t>
+              <a:t>WinPhone</a:t>
             </a:r>
             <a:r>
               <a:rPr lang="en-US" sz="2800" dirty="0" smtClean="0">
@@ -18650,7 +18789,7 @@
                 <a:ea typeface="Calibri"/>
                 <a:cs typeface="Times New Roman"/>
               </a:rPr>
-              <a:t>iPhone</a:t>
+              <a:t>Windows Phone OS</a:t>
             </a:r>
             <a:r>
               <a:rPr lang="en-US" sz="2800" dirty="0" smtClean="0">
@@ -18719,6 +18858,386 @@
 </file>
 
 <file path=ppt/slides/slide8.xml><?xml version="1.0" encoding="utf-8"?>
+<p:sld xmlns:a="http://schemas.openxmlformats.org/drawingml/2006/main" xmlns:r="http://schemas.openxmlformats.org/officeDocument/2006/relationships" xmlns:p="http://schemas.openxmlformats.org/presentationml/2006/main">
+  <p:cSld>
+    <p:spTree>
+      <p:nvGrpSpPr>
+        <p:cNvPr id="1" name=""/>
+        <p:cNvGrpSpPr/>
+        <p:nvPr/>
+      </p:nvGrpSpPr>
+      <p:grpSpPr>
+        <a:xfrm>
+          <a:off x="0" y="0"/>
+          <a:ext cx="0" cy="0"/>
+          <a:chOff x="0" y="0"/>
+          <a:chExt cx="0" cy="0"/>
+        </a:xfrm>
+      </p:grpSpPr>
+      <p:pic>
+        <p:nvPicPr>
+          <p:cNvPr id="3" name="Picture 2"/>
+          <p:cNvPicPr>
+            <a:picLocks noChangeAspect="1"/>
+          </p:cNvPicPr>
+          <p:nvPr/>
+        </p:nvPicPr>
+        <p:blipFill>
+          <a:blip r:embed="rId3">
+            <a:extLst>
+              <a:ext uri="{28A0092B-C50C-407E-A947-70E740481C1C}">
+                <a14:useLocalDpi xmlns:a14="http://schemas.microsoft.com/office/drawing/2010/main" val="0"/>
+              </a:ext>
+            </a:extLst>
+          </a:blip>
+          <a:stretch>
+            <a:fillRect/>
+          </a:stretch>
+        </p:blipFill>
+        <p:spPr>
+          <a:xfrm>
+            <a:off x="8612232" y="808892"/>
+            <a:ext cx="2955612" cy="5332566"/>
+          </a:xfrm>
+          <a:prstGeom prst="rect">
+            <a:avLst/>
+          </a:prstGeom>
+        </p:spPr>
+      </p:pic>
+      <p:pic>
+        <p:nvPicPr>
+          <p:cNvPr id="7" name="Picture 6"/>
+          <p:cNvPicPr>
+            <a:picLocks noChangeAspect="1"/>
+          </p:cNvPicPr>
+          <p:nvPr/>
+        </p:nvPicPr>
+        <p:blipFill>
+          <a:blip r:embed="rId4">
+            <a:extLst>
+              <a:ext uri="{28A0092B-C50C-407E-A947-70E740481C1C}">
+                <a14:useLocalDpi xmlns:a14="http://schemas.microsoft.com/office/drawing/2010/main" val="0"/>
+              </a:ext>
+            </a:extLst>
+          </a:blip>
+          <a:stretch>
+            <a:fillRect/>
+          </a:stretch>
+        </p:blipFill>
+        <p:spPr>
+          <a:xfrm>
+            <a:off x="5086434" y="808892"/>
+            <a:ext cx="2990994" cy="5332566"/>
+          </a:xfrm>
+          <a:prstGeom prst="rect">
+            <a:avLst/>
+          </a:prstGeom>
+        </p:spPr>
+      </p:pic>
+      <p:sp>
+        <p:nvSpPr>
+          <p:cNvPr id="9" name="Content Placeholder 5"/>
+          <p:cNvSpPr txBox="1">
+            <a:spLocks/>
+          </p:cNvSpPr>
+          <p:nvPr>
+            <p:custDataLst>
+              <p:tags r:id="rId1"/>
+            </p:custDataLst>
+          </p:nvPr>
+        </p:nvSpPr>
+        <p:spPr>
+          <a:xfrm>
+            <a:off x="336772" y="808891"/>
+            <a:ext cx="4575197" cy="4161693"/>
+          </a:xfrm>
+          <a:prstGeom prst="rect">
+            <a:avLst/>
+          </a:prstGeom>
+        </p:spPr>
+        <p:txBody>
+          <a:bodyPr/>
+          <a:lstStyle>
+            <a:lvl1pPr marL="460375" indent="-460375" algn="l" defTabSz="914363" rtl="0" eaLnBrk="1" latinLnBrk="0" hangingPunct="1">
+              <a:lnSpc>
+                <a:spcPct val="90000"/>
+              </a:lnSpc>
+              <a:spcBef>
+                <a:spcPct val="20000"/>
+              </a:spcBef>
+              <a:buSzPct val="80000"/>
+              <a:buFont typeface="Arial" pitchFamily="34" charset="0"/>
+              <a:buChar char="•"/>
+              <a:defRPr sz="3200" kern="1200">
+                <a:gradFill>
+                  <a:gsLst>
+                    <a:gs pos="0">
+                      <a:srgbClr val="595959"/>
+                    </a:gs>
+                    <a:gs pos="86000">
+                      <a:srgbClr val="595959"/>
+                    </a:gs>
+                  </a:gsLst>
+                  <a:lin ang="5400000" scaled="0"/>
+                </a:gradFill>
+                <a:latin typeface="+mn-lt"/>
+                <a:ea typeface="+mn-ea"/>
+                <a:cs typeface="+mn-cs"/>
+              </a:defRPr>
+            </a:lvl1pPr>
+            <a:lvl2pPr marL="855663" indent="-395288" algn="l" defTabSz="914363" rtl="0" eaLnBrk="1" latinLnBrk="0" hangingPunct="1">
+              <a:lnSpc>
+                <a:spcPct val="90000"/>
+              </a:lnSpc>
+              <a:spcBef>
+                <a:spcPct val="20000"/>
+              </a:spcBef>
+              <a:buSzPct val="80000"/>
+              <a:buFont typeface="Arial" pitchFamily="34" charset="0"/>
+              <a:buChar char="•"/>
+              <a:defRPr sz="2800" kern="1200">
+                <a:gradFill>
+                  <a:gsLst>
+                    <a:gs pos="0">
+                      <a:srgbClr val="595959"/>
+                    </a:gs>
+                    <a:gs pos="86000">
+                      <a:srgbClr val="595959"/>
+                    </a:gs>
+                  </a:gsLst>
+                  <a:lin ang="5400000" scaled="0"/>
+                </a:gradFill>
+                <a:latin typeface="+mn-lt"/>
+                <a:ea typeface="+mn-ea"/>
+                <a:cs typeface="+mn-cs"/>
+              </a:defRPr>
+            </a:lvl2pPr>
+            <a:lvl3pPr marL="1258888" indent="-403225" algn="l" defTabSz="914363" rtl="0" eaLnBrk="1" latinLnBrk="0" hangingPunct="1">
+              <a:lnSpc>
+                <a:spcPct val="90000"/>
+              </a:lnSpc>
+              <a:spcBef>
+                <a:spcPct val="20000"/>
+              </a:spcBef>
+              <a:buSzPct val="80000"/>
+              <a:buFont typeface="Arial" pitchFamily="34" charset="0"/>
+              <a:buChar char="•"/>
+              <a:defRPr sz="2400" kern="1200">
+                <a:gradFill>
+                  <a:gsLst>
+                    <a:gs pos="0">
+                      <a:srgbClr val="595959"/>
+                    </a:gs>
+                    <a:gs pos="86000">
+                      <a:srgbClr val="595959"/>
+                    </a:gs>
+                  </a:gsLst>
+                  <a:lin ang="5400000" scaled="0"/>
+                </a:gradFill>
+                <a:latin typeface="+mn-lt"/>
+                <a:ea typeface="+mn-ea"/>
+                <a:cs typeface="+mn-cs"/>
+              </a:defRPr>
+            </a:lvl3pPr>
+            <a:lvl4pPr marL="1604963" indent="-346075" algn="l" defTabSz="914363" rtl="0" eaLnBrk="1" latinLnBrk="0" hangingPunct="1">
+              <a:lnSpc>
+                <a:spcPct val="90000"/>
+              </a:lnSpc>
+              <a:spcBef>
+                <a:spcPct val="20000"/>
+              </a:spcBef>
+              <a:buSzPct val="80000"/>
+              <a:buFont typeface="Arial" pitchFamily="34" charset="0"/>
+              <a:buChar char="•"/>
+              <a:defRPr sz="2000" kern="1200">
+                <a:gradFill>
+                  <a:gsLst>
+                    <a:gs pos="0">
+                      <a:srgbClr val="595959"/>
+                    </a:gs>
+                    <a:gs pos="86000">
+                      <a:srgbClr val="595959"/>
+                    </a:gs>
+                  </a:gsLst>
+                  <a:lin ang="5400000" scaled="0"/>
+                </a:gradFill>
+                <a:latin typeface="+mn-lt"/>
+                <a:ea typeface="+mn-ea"/>
+                <a:cs typeface="+mn-cs"/>
+              </a:defRPr>
+            </a:lvl4pPr>
+            <a:lvl5pPr marL="1941513" indent="-336550" algn="l" defTabSz="914363" rtl="0" eaLnBrk="1" latinLnBrk="0" hangingPunct="1">
+              <a:lnSpc>
+                <a:spcPct val="90000"/>
+              </a:lnSpc>
+              <a:spcBef>
+                <a:spcPct val="20000"/>
+              </a:spcBef>
+              <a:buSzPct val="80000"/>
+              <a:buFont typeface="Arial" pitchFamily="34" charset="0"/>
+              <a:buChar char="•"/>
+              <a:defRPr sz="2000" kern="1200">
+                <a:gradFill>
+                  <a:gsLst>
+                    <a:gs pos="0">
+                      <a:srgbClr val="595959"/>
+                    </a:gs>
+                    <a:gs pos="86000">
+                      <a:srgbClr val="595959"/>
+                    </a:gs>
+                  </a:gsLst>
+                  <a:lin ang="5400000" scaled="0"/>
+                </a:gradFill>
+                <a:latin typeface="+mn-lt"/>
+                <a:ea typeface="+mn-ea"/>
+                <a:cs typeface="+mn-cs"/>
+              </a:defRPr>
+            </a:lvl5pPr>
+            <a:lvl6pPr marL="2514499" indent="-228591" algn="l" defTabSz="914363" rtl="0" eaLnBrk="1" latinLnBrk="0" hangingPunct="1">
+              <a:spcBef>
+                <a:spcPct val="20000"/>
+              </a:spcBef>
+              <a:buFont typeface="Arial" pitchFamily="34" charset="0"/>
+              <a:buChar char="•"/>
+              <a:defRPr sz="2000" kern="1200">
+                <a:solidFill>
+                  <a:schemeClr val="tx1"/>
+                </a:solidFill>
+                <a:latin typeface="+mn-lt"/>
+                <a:ea typeface="+mn-ea"/>
+                <a:cs typeface="+mn-cs"/>
+              </a:defRPr>
+            </a:lvl6pPr>
+            <a:lvl7pPr marL="2971681" indent="-228591" algn="l" defTabSz="914363" rtl="0" eaLnBrk="1" latinLnBrk="0" hangingPunct="1">
+              <a:spcBef>
+                <a:spcPct val="20000"/>
+              </a:spcBef>
+              <a:buFont typeface="Arial" pitchFamily="34" charset="0"/>
+              <a:buChar char="•"/>
+              <a:defRPr sz="2000" kern="1200">
+                <a:solidFill>
+                  <a:schemeClr val="tx1"/>
+                </a:solidFill>
+                <a:latin typeface="+mn-lt"/>
+                <a:ea typeface="+mn-ea"/>
+                <a:cs typeface="+mn-cs"/>
+              </a:defRPr>
+            </a:lvl7pPr>
+            <a:lvl8pPr marL="3428863" indent="-228591" algn="l" defTabSz="914363" rtl="0" eaLnBrk="1" latinLnBrk="0" hangingPunct="1">
+              <a:spcBef>
+                <a:spcPct val="20000"/>
+              </a:spcBef>
+              <a:buFont typeface="Arial" pitchFamily="34" charset="0"/>
+              <a:buChar char="•"/>
+              <a:defRPr sz="2000" kern="1200">
+                <a:solidFill>
+                  <a:schemeClr val="tx1"/>
+                </a:solidFill>
+                <a:latin typeface="+mn-lt"/>
+                <a:ea typeface="+mn-ea"/>
+                <a:cs typeface="+mn-cs"/>
+              </a:defRPr>
+            </a:lvl8pPr>
+            <a:lvl9pPr marL="3886045" indent="-228591" algn="l" defTabSz="914363" rtl="0" eaLnBrk="1" latinLnBrk="0" hangingPunct="1">
+              <a:spcBef>
+                <a:spcPct val="20000"/>
+              </a:spcBef>
+              <a:buFont typeface="Arial" pitchFamily="34" charset="0"/>
+              <a:buChar char="•"/>
+              <a:defRPr sz="2000" kern="1200">
+                <a:solidFill>
+                  <a:schemeClr val="tx1"/>
+                </a:solidFill>
+                <a:latin typeface="+mn-lt"/>
+                <a:ea typeface="+mn-ea"/>
+                <a:cs typeface="+mn-cs"/>
+              </a:defRPr>
+            </a:lvl9pPr>
+          </a:lstStyle>
+          <a:p>
+            <a:pPr marL="0" indent="0">
+              <a:buNone/>
+            </a:pPr>
+            <a:r>
+              <a:rPr lang="en-US" dirty="0" smtClean="0"/>
+              <a:t>Windows Phone Display</a:t>
+            </a:r>
+          </a:p>
+          <a:p>
+            <a:pPr marL="0" indent="0">
+              <a:buNone/>
+            </a:pPr>
+            <a:r>
+              <a:rPr lang="en-US" dirty="0" smtClean="0"/>
+              <a:t>Mode Example</a:t>
+            </a:r>
+          </a:p>
+          <a:p>
+            <a:pPr marL="0" indent="0">
+              <a:buNone/>
+            </a:pPr>
+            <a:endParaRPr lang="en-US" dirty="0"/>
+          </a:p>
+          <a:p>
+            <a:pPr marL="0" indent="0">
+              <a:buNone/>
+            </a:pPr>
+            <a:r>
+              <a:rPr lang="en-US" dirty="0" smtClean="0"/>
+              <a:t>Same URL</a:t>
+            </a:r>
+          </a:p>
+          <a:p>
+            <a:pPr marL="0" indent="0">
+              <a:buNone/>
+            </a:pPr>
+            <a:r>
+              <a:rPr lang="en-US" dirty="0" smtClean="0"/>
+              <a:t>Different view</a:t>
+            </a:r>
+          </a:p>
+          <a:p>
+            <a:pPr marL="0" indent="0">
+              <a:buNone/>
+            </a:pPr>
+            <a:r>
+              <a:rPr lang="en-US" dirty="0" smtClean="0"/>
+              <a:t>Based on custom view </a:t>
+            </a:r>
+          </a:p>
+          <a:p>
+            <a:pPr marL="0" indent="0">
+              <a:buNone/>
+            </a:pPr>
+            <a:r>
+              <a:rPr lang="en-US" dirty="0"/>
+              <a:t>	</a:t>
+            </a:r>
+            <a:r>
+              <a:rPr lang="en-US" dirty="0" smtClean="0"/>
+              <a:t>mode criteria</a:t>
+            </a:r>
+            <a:endParaRPr lang="en-US" dirty="0"/>
+          </a:p>
+        </p:txBody>
+      </p:sp>
+    </p:spTree>
+    <p:extLst>
+      <p:ext uri="{BB962C8B-B14F-4D97-AF65-F5344CB8AC3E}">
+        <p14:creationId xmlns:p14="http://schemas.microsoft.com/office/powerpoint/2010/main" val="2043843635"/>
+      </p:ext>
+    </p:extLst>
+  </p:cSld>
+  <p:clrMapOvr>
+    <a:masterClrMapping/>
+  </p:clrMapOvr>
+  <p:transition>
+    <p:fade/>
+  </p:transition>
+</p:sld>
+</file>
+
+<file path=ppt/slides/slide9.xml><?xml version="1.0" encoding="utf-8"?>
 <p:sld xmlns:a="http://schemas.openxmlformats.org/drawingml/2006/main" xmlns:r="http://schemas.openxmlformats.org/officeDocument/2006/relationships" xmlns:p="http://schemas.openxmlformats.org/presentationml/2006/main">
   <p:cSld>
     <p:spTree>
@@ -18820,96 +19339,6 @@
 </p:sld>
 </file>
 
-<file path=ppt/slides/slide9.xml><?xml version="1.0" encoding="utf-8"?>
-<p:sld xmlns:a="http://schemas.openxmlformats.org/drawingml/2006/main" xmlns:r="http://schemas.openxmlformats.org/officeDocument/2006/relationships" xmlns:p="http://schemas.openxmlformats.org/presentationml/2006/main">
-  <p:cSld>
-    <p:spTree>
-      <p:nvGrpSpPr>
-        <p:cNvPr id="1" name=""/>
-        <p:cNvGrpSpPr/>
-        <p:nvPr/>
-      </p:nvGrpSpPr>
-      <p:grpSpPr>
-        <a:xfrm>
-          <a:off x="0" y="0"/>
-          <a:ext cx="0" cy="0"/>
-          <a:chOff x="0" y="0"/>
-          <a:chExt cx="0" cy="0"/>
-        </a:xfrm>
-      </p:grpSpPr>
-      <p:sp>
-        <p:nvSpPr>
-          <p:cNvPr id="2" name="Title 1"/>
-          <p:cNvSpPr>
-            <a:spLocks noGrp="1"/>
-          </p:cNvSpPr>
-          <p:nvPr>
-            <p:ph type="title"/>
-          </p:nvPr>
-        </p:nvSpPr>
-        <p:spPr/>
-        <p:txBody>
-          <a:bodyPr/>
-          <a:lstStyle/>
-          <a:p>
-            <a:r>
-              <a:rPr lang="en-US" dirty="0" smtClean="0"/>
-              <a:t>Resources</a:t>
-            </a:r>
-            <a:endParaRPr lang="en-US" dirty="0"/>
-          </a:p>
-        </p:txBody>
-      </p:sp>
-      <p:sp>
-        <p:nvSpPr>
-          <p:cNvPr id="3" name="Text Placeholder 2"/>
-          <p:cNvSpPr>
-            <a:spLocks noGrp="1"/>
-          </p:cNvSpPr>
-          <p:nvPr>
-            <p:ph type="body" sz="quarter" idx="10"/>
-          </p:nvPr>
-        </p:nvSpPr>
-        <p:spPr>
-          <a:xfrm>
-            <a:off x="519112" y="1447799"/>
-            <a:ext cx="11149013" cy="1107996"/>
-          </a:xfrm>
-        </p:spPr>
-        <p:txBody>
-          <a:bodyPr/>
-          <a:lstStyle/>
-          <a:p>
-            <a:r>
-              <a:rPr lang="en-US" dirty="0"/>
-              <a:t>http://www.asp.net/mvc/tutorials/mvc-4/aspnet-mvc-4-mobile-features</a:t>
-            </a:r>
-          </a:p>
-        </p:txBody>
-      </p:sp>
-    </p:spTree>
-    <p:extLst>
-      <p:ext uri="{BB962C8B-B14F-4D97-AF65-F5344CB8AC3E}">
-        <p14:creationId xmlns:p14="http://schemas.microsoft.com/office/powerpoint/2010/main" val="63434339"/>
-      </p:ext>
-    </p:extLst>
-  </p:cSld>
-  <p:clrMapOvr>
-    <a:masterClrMapping/>
-  </p:clrMapOvr>
-  <p:transition>
-    <p:fade/>
-  </p:transition>
-  <p:timing>
-    <p:tnLst>
-      <p:par>
-        <p:cTn id="1" dur="indefinite" restart="never" nodeType="tmRoot"/>
-      </p:par>
-    </p:tnLst>
-  </p:timing>
-</p:sld>
-</file>
-
 <file path=ppt/tags/tag1.xml><?xml version="1.0" encoding="utf-8"?>
 <p:tagLst xmlns:a="http://schemas.openxmlformats.org/drawingml/2006/main" xmlns:r="http://schemas.openxmlformats.org/officeDocument/2006/relationships" xmlns:p="http://schemas.openxmlformats.org/presentationml/2006/main">
   <p:tag name="THINKCELLUNDODONOTDELETE" val="26"/>
@@ -18941,6 +19370,12 @@
 </file>
 
 <file path=ppt/tags/tag6.xml><?xml version="1.0" encoding="utf-8"?>
+<p:tagLst xmlns:a="http://schemas.openxmlformats.org/drawingml/2006/main" xmlns:r="http://schemas.openxmlformats.org/officeDocument/2006/relationships" xmlns:p="http://schemas.openxmlformats.org/presentationml/2006/main">
+  <p:tag name="THINKCELLSHAPEDONOTDELETE" val="p6nKz.PWryUeu7CaDkJE7hw"/>
+</p:tagLst>
+</file>
+
+<file path=ppt/tags/tag7.xml><?xml version="1.0" encoding="utf-8"?>
 <p:tagLst xmlns:a="http://schemas.openxmlformats.org/drawingml/2006/main" xmlns:r="http://schemas.openxmlformats.org/officeDocument/2006/relationships" xmlns:p="http://schemas.openxmlformats.org/presentationml/2006/main">
   <p:tag name="THINKCELLSHAPEDONOTDELETE" val="thinkcellActiveDocDoNotDelete"/>
 </p:tagLst>
@@ -20326,15 +20761,15 @@
 <file path=customXml/itemProps1.xml><?xml version="1.0" encoding="utf-8"?>
 <ds:datastoreItem xmlns:ds="http://schemas.openxmlformats.org/officeDocument/2006/customXml" ds:itemID="{69B2F97D-0457-4986-9734-D03EB073C5EA}">
   <ds:schemaRefs>
+    <ds:schemaRef ds:uri="http://schemas.microsoft.com/office/2006/documentManagement/types"/>
+    <ds:schemaRef ds:uri="http://purl.org/dc/terms/"/>
+    <ds:schemaRef ds:uri="http://purl.org/dc/dcmitype/"/>
+    <ds:schemaRef ds:uri="http://schemas.openxmlformats.org/package/2006/metadata/core-properties"/>
+    <ds:schemaRef ds:uri="http://purl.org/dc/elements/1.1/"/>
     <ds:schemaRef ds:uri="http://schemas.microsoft.com/office/infopath/2007/PartnerControls"/>
-    <ds:schemaRef ds:uri="http://purl.org/dc/terms/"/>
-    <ds:schemaRef ds:uri="http://schemas.microsoft.com/office/2006/documentManagement/types"/>
-    <ds:schemaRef ds:uri="http://purl.org/dc/elements/1.1/"/>
-    <ds:schemaRef ds:uri="http://schemas.openxmlformats.org/package/2006/metadata/core-properties"/>
     <ds:schemaRef ds:uri="230e9df3-be65-4c73-a93b-d1236ebd677e"/>
     <ds:schemaRef ds:uri="http://schemas.microsoft.com/office/2006/metadata/properties"/>
     <ds:schemaRef ds:uri="http://www.w3.org/XML/1998/namespace"/>
-    <ds:schemaRef ds:uri="http://purl.org/dc/dcmitype/"/>
   </ds:schemaRefs>
 </ds:datastoreItem>
 </file>

</xml_diff>